<commit_message>
fertige Präsi. Hürden beim TestEditor steht noch nichts
</commit_message>
<xml_diff>
--- a/TestenMileStone3.pptx
+++ b/TestenMileStone3.pptx
@@ -226,7 +226,7 @@
           <a:p>
             <a:fld id="{65DD71D7-55AC-46BD-81B3-09AB2F9EFBD8}" type="datetimeFigureOut">
               <a:rPr lang="de-DE" smtClean="0"/>
-              <a:t>tt.01.jjjj</a:t>
+              <a:t>10.01.2016</a:t>
             </a:fld>
             <a:endParaRPr lang="de-DE" dirty="0"/>
           </a:p>
@@ -391,7 +391,7 @@
           <a:p>
             <a:fld id="{1F89424F-BB59-4F4E-9822-4CA3E770FFD2}" type="datetimeFigureOut">
               <a:rPr lang="de-DE" smtClean="0"/>
-              <a:t>tt.01.jjjj</a:t>
+              <a:t>10.01.2016</a:t>
             </a:fld>
             <a:endParaRPr lang="de-DE" dirty="0"/>
           </a:p>
@@ -1202,7 +1202,7 @@
           <a:p>
             <a:fld id="{8AE61375-67D6-420B-86AE-DA020D70A190}" type="datetime1">
               <a:rPr lang="de-DE" smtClean="0"/>
-              <a:t>tt.01.jjjj</a:t>
+              <a:t>10.01.2016</a:t>
             </a:fld>
             <a:endParaRPr lang="de-DE" dirty="0"/>
           </a:p>
@@ -1398,7 +1398,7 @@
           <a:p>
             <a:fld id="{4C3CB006-1C8F-4FFF-9886-C7F4371DAF23}" type="datetime1">
               <a:rPr lang="de-DE" smtClean="0"/>
-              <a:t>tt.01.jjjj</a:t>
+              <a:t>10.01.2016</a:t>
             </a:fld>
             <a:endParaRPr lang="de-DE" dirty="0"/>
           </a:p>
@@ -1584,7 +1584,7 @@
           <a:p>
             <a:fld id="{D321307D-809D-48F8-91EE-9AA8198446F8}" type="datetime1">
               <a:rPr lang="de-DE" smtClean="0"/>
-              <a:t>tt.01.jjjj</a:t>
+              <a:t>10.01.2016</a:t>
             </a:fld>
             <a:endParaRPr lang="de-DE" dirty="0"/>
           </a:p>
@@ -2183,7 +2183,7 @@
           <a:p>
             <a:fld id="{7F2630C1-7A3F-498A-B70C-5B81638D9A90}" type="datetime1">
               <a:rPr lang="de-DE" smtClean="0"/>
-              <a:t>tt.01.jjjj</a:t>
+              <a:t>10.01.2016</a:t>
             </a:fld>
             <a:endParaRPr lang="de-DE" dirty="0"/>
           </a:p>
@@ -2631,7 +2631,7 @@
           <a:p>
             <a:fld id="{073F4EA5-F2B1-4A30-B391-9C13E4EB1066}" type="datetime1">
               <a:rPr lang="de-DE" smtClean="0"/>
-              <a:t>tt.01.jjjj</a:t>
+              <a:t>10.01.2016</a:t>
             </a:fld>
             <a:endParaRPr lang="de-DE" dirty="0"/>
           </a:p>
@@ -2765,7 +2765,7 @@
           <a:p>
             <a:fld id="{D6A603CA-3662-4A3A-83DC-758F233EE0F1}" type="datetime1">
               <a:rPr lang="de-DE" smtClean="0"/>
-              <a:t>tt.01.jjjj</a:t>
+              <a:t>10.01.2016</a:t>
             </a:fld>
             <a:endParaRPr lang="de-DE" dirty="0"/>
           </a:p>
@@ -2876,7 +2876,7 @@
           <a:p>
             <a:fld id="{C78925BB-189B-4468-A51B-FBC34BAEE2A3}" type="datetime1">
               <a:rPr lang="de-DE" smtClean="0"/>
-              <a:t>tt.01.jjjj</a:t>
+              <a:t>10.01.2016</a:t>
             </a:fld>
             <a:endParaRPr lang="de-DE" dirty="0"/>
           </a:p>
@@ -3305,7 +3305,7 @@
           <a:p>
             <a:fld id="{A4A24417-A66A-4DB9-A411-86E6167B556E}" type="datetime1">
               <a:rPr lang="de-DE" smtClean="0"/>
-              <a:t>tt.01.jjjj</a:t>
+              <a:t>10.01.2016</a:t>
             </a:fld>
             <a:endParaRPr lang="de-DE" dirty="0"/>
           </a:p>
@@ -3724,7 +3724,7 @@
           <a:p>
             <a:fld id="{2B5E8D1E-9E6B-4DE7-806A-E0D9A440D85A}" type="datetime1">
               <a:rPr lang="de-DE" smtClean="0"/>
-              <a:t>tt.01.jjjj</a:t>
+              <a:t>10.01.2016</a:t>
             </a:fld>
             <a:endParaRPr lang="de-DE" dirty="0"/>
           </a:p>
@@ -4001,7 +4001,7 @@
           <a:p>
             <a:fld id="{76EFFB5E-0A4E-4527-8E61-46DE082A53B6}" type="datetime1">
               <a:rPr lang="de-DE" smtClean="0"/>
-              <a:t>tt.01.jjjj</a:t>
+              <a:t>10.01.2016</a:t>
             </a:fld>
             <a:endParaRPr lang="de-DE" dirty="0"/>
           </a:p>
@@ -6419,14 +6419,32 @@
           <a:p>
             <a:r>
               <a:rPr lang="de-DE" dirty="0" smtClean="0"/>
-              <a:t>Insgesamt lief das Projekt teilweise sehr holprig, da sich einige Hürden als sehr kompliziert herausstellten.  </a:t>
-            </a:r>
-          </a:p>
-          <a:p>
-            <a:r>
-              <a:rPr lang="de-DE" dirty="0" smtClean="0"/>
-              <a:t>Jedoch wurde durch das Projekt ein guter Einblick in die verschiedenen Testprogramm gewährt.</a:t>
-            </a:r>
+              <a:t>Aufgezählten Hürden komplizierten das Projekt</a:t>
+            </a:r>
+            <a:endParaRPr lang="de-DE" dirty="0"/>
+          </a:p>
+          <a:p>
+            <a:r>
+              <a:rPr lang="de-DE" dirty="0" smtClean="0"/>
+              <a:t>Jedoch </a:t>
+            </a:r>
+            <a:r>
+              <a:rPr lang="de-DE" dirty="0" smtClean="0"/>
+              <a:t>wurde </a:t>
+            </a:r>
+            <a:r>
+              <a:rPr lang="de-DE" dirty="0" smtClean="0"/>
+              <a:t>ein </a:t>
+            </a:r>
+            <a:r>
+              <a:rPr lang="de-DE" dirty="0" smtClean="0"/>
+              <a:t>guter Einblick in die verschiedenen Testprogramm </a:t>
+            </a:r>
+            <a:r>
+              <a:rPr lang="de-DE" dirty="0" smtClean="0"/>
+              <a:t>gewährt</a:t>
+            </a:r>
+            <a:endParaRPr lang="de-DE" dirty="0" smtClean="0"/>
           </a:p>
         </p:txBody>
       </p:sp>
@@ -6794,7 +6812,7 @@
         <p:spPr>
           <a:xfrm>
             <a:off x="1295400" y="1806423"/>
-            <a:ext cx="4590092" cy="1477328"/>
+            <a:ext cx="4590092" cy="2092881"/>
           </a:xfrm>
           <a:prstGeom prst="rect">
             <a:avLst/>
@@ -6812,9 +6830,30 @@
               <a:buChar char="•"/>
             </a:pPr>
             <a:r>
-              <a:rPr lang="de-DE" dirty="0" smtClean="0"/>
-              <a:t>Ziel diese Projektes war es den Kreislauf zu schließen.</a:t>
-            </a:r>
+              <a:rPr lang="de-DE" sz="2000" dirty="0" smtClean="0"/>
+              <a:t>Ziel</a:t>
+            </a:r>
+            <a:r>
+              <a:rPr lang="de-DE" dirty="0" smtClean="0"/>
+              <a:t>: </a:t>
+            </a:r>
+          </a:p>
+          <a:p>
+            <a:r>
+              <a:rPr lang="de-DE" dirty="0"/>
+              <a:t> </a:t>
+            </a:r>
+            <a:r>
+              <a:rPr lang="de-DE" dirty="0" smtClean="0"/>
+              <a:t>   </a:t>
+            </a:r>
+            <a:r>
+              <a:rPr lang="de-DE" dirty="0" smtClean="0"/>
+              <a:t> Kreislauf zu schließen</a:t>
+            </a:r>
+          </a:p>
+          <a:p>
+            <a:endParaRPr lang="de-DE" dirty="0" smtClean="0"/>
           </a:p>
           <a:p>
             <a:pPr marL="285750" indent="-285750">
@@ -6822,8 +6861,18 @@
               <a:buChar char="•"/>
             </a:pPr>
             <a:r>
-              <a:rPr lang="de-DE" dirty="0" smtClean="0"/>
-              <a:t>Grundlage war der </a:t>
+              <a:rPr lang="de-DE" sz="2000" dirty="0" smtClean="0"/>
+              <a:t>Grundlage</a:t>
+            </a:r>
+            <a:r>
+              <a:rPr lang="de-DE" dirty="0" smtClean="0"/>
+              <a:t>:</a:t>
+            </a:r>
+          </a:p>
+          <a:p>
+            <a:r>
+              <a:rPr lang="de-DE" dirty="0" smtClean="0"/>
+              <a:t>                   - </a:t>
             </a:r>
             <a:r>
               <a:rPr lang="de-DE" dirty="0" err="1" smtClean="0"/>
@@ -6831,7 +6880,15 @@
             </a:r>
             <a:r>
               <a:rPr lang="de-DE" dirty="0" smtClean="0"/>
-              <a:t> aus dem Vorsemester und </a:t>
+              <a:t> </a:t>
+            </a:r>
+            <a:r>
+              <a:rPr lang="de-DE" dirty="0" smtClean="0"/>
+              <a:t>aus dem Vorsemester </a:t>
+            </a:r>
+            <a:r>
+              <a:rPr lang="de-DE" dirty="0" smtClean="0"/>
+              <a:t>              	 - </a:t>
             </a:r>
             <a:r>
               <a:rPr lang="de-DE" dirty="0" err="1" smtClean="0"/>
@@ -6936,32 +6993,105 @@
           <a:lstStyle/>
           <a:p>
             <a:r>
-              <a:rPr lang="de-DE" dirty="0" smtClean="0"/>
-              <a:t>Ziel des ersten Meilensteins war es die Funktionsweise der einzelnen Programme heraus zu finden.</a:t>
-            </a:r>
-          </a:p>
-          <a:p>
-            <a:r>
-              <a:rPr lang="de-DE" dirty="0" smtClean="0"/>
-              <a:t>Da ergaben sich folgende Probleme</a:t>
-            </a:r>
-          </a:p>
-          <a:p>
-            <a:pPr lvl="1"/>
+              <a:rPr lang="de-DE" sz="2200" dirty="0" smtClean="0"/>
+              <a:t>Ziel</a:t>
+            </a:r>
+            <a:r>
+              <a:rPr lang="de-DE" dirty="0" smtClean="0"/>
+              <a:t>:</a:t>
+            </a:r>
+          </a:p>
+          <a:p>
+            <a:pPr marL="45720" indent="0">
+              <a:spcBef>
+                <a:spcPts val="0"/>
+              </a:spcBef>
+              <a:buNone/>
+            </a:pPr>
+            <a:r>
+              <a:rPr lang="de-DE" dirty="0" smtClean="0"/>
+              <a:t>              Funktionsweise </a:t>
+            </a:r>
+            <a:r>
+              <a:rPr lang="de-DE" dirty="0" smtClean="0"/>
+              <a:t>der einzelnen </a:t>
+            </a:r>
+            <a:r>
+              <a:rPr lang="de-DE" dirty="0" smtClean="0"/>
+              <a:t>Programme zu verstehen</a:t>
+            </a:r>
+          </a:p>
+          <a:p>
+            <a:pPr>
+              <a:spcBef>
+                <a:spcPts val="0"/>
+              </a:spcBef>
+            </a:pPr>
+            <a:r>
+              <a:rPr lang="de-DE" sz="2200" dirty="0" smtClean="0"/>
+              <a:t>Probleme</a:t>
+            </a:r>
+            <a:r>
+              <a:rPr lang="de-DE" dirty="0" smtClean="0"/>
+              <a:t>:</a:t>
+            </a:r>
+          </a:p>
+          <a:p>
+            <a:pPr marL="45720" indent="0">
+              <a:spcBef>
+                <a:spcPts val="0"/>
+              </a:spcBef>
+              <a:buNone/>
+            </a:pPr>
+            <a:r>
+              <a:rPr lang="de-DE" dirty="0" smtClean="0"/>
+              <a:t>	Timeout bei Inaktivität in </a:t>
+            </a:r>
             <a:r>
               <a:rPr lang="de-DE" dirty="0" err="1" smtClean="0"/>
               <a:t>Appium</a:t>
             </a:r>
             <a:r>
               <a:rPr lang="de-DE" dirty="0" smtClean="0"/>
-              <a:t> beendete die Session nach 60 Sekunden ohne Aktivität. Dieses Problem tritt meist bei langsamen Rechner auf. </a:t>
-            </a:r>
-          </a:p>
-          <a:p>
-            <a:pPr lvl="1"/>
-            <a:r>
-              <a:rPr lang="de-DE" dirty="0" smtClean="0"/>
-              <a:t>Ebenso waren die Beispiel </a:t>
+              <a:t> </a:t>
+            </a:r>
+            <a:r>
+              <a:rPr lang="de-DE" dirty="0"/>
+              <a:t>	</a:t>
+            </a:r>
+            <a:endParaRPr lang="de-DE" dirty="0" smtClean="0"/>
+          </a:p>
+          <a:p>
+            <a:pPr marL="45720" indent="0">
+              <a:spcBef>
+                <a:spcPts val="0"/>
+              </a:spcBef>
+              <a:buNone/>
+            </a:pPr>
+            <a:r>
+              <a:rPr lang="de-DE" dirty="0"/>
+              <a:t>	</a:t>
+            </a:r>
+            <a:r>
+              <a:rPr lang="de-DE" dirty="0" smtClean="0"/>
+              <a:t>-&gt; problematisch für langsame Computer</a:t>
+            </a:r>
+            <a:endParaRPr lang="de-DE" dirty="0"/>
+          </a:p>
+          <a:p>
+            <a:pPr marL="45720" indent="0">
+              <a:spcBef>
+                <a:spcPts val="0"/>
+              </a:spcBef>
+              <a:buNone/>
+            </a:pPr>
+            <a:r>
+              <a:rPr lang="de-DE" dirty="0"/>
+              <a:t>	</a:t>
+            </a:r>
+            <a:r>
+              <a:rPr lang="de-DE" dirty="0" smtClean="0"/>
+              <a:t>veraltete Beispiel </a:t>
             </a:r>
             <a:r>
               <a:rPr lang="de-DE" dirty="0" err="1" smtClean="0"/>
@@ -6969,19 +7099,24 @@
             </a:r>
             <a:r>
               <a:rPr lang="de-DE" dirty="0" smtClean="0"/>
-              <a:t> von </a:t>
-            </a:r>
-            <a:r>
-              <a:rPr lang="de-DE" dirty="0" err="1" smtClean="0"/>
-              <a:t>TestEditor</a:t>
-            </a:r>
-            <a:r>
-              <a:rPr lang="de-DE" dirty="0" smtClean="0"/>
-              <a:t> veraltet, so mussten dort zum Beispiel auch noch Anpassungen vorgenommen werden. </a:t>
-            </a:r>
-          </a:p>
-          <a:p>
-            <a:pPr lvl="1"/>
+              <a:t> bei dem Testeditor</a:t>
+            </a:r>
+          </a:p>
+          <a:p>
+            <a:pPr marL="45720" indent="0">
+              <a:spcBef>
+                <a:spcPts val="0"/>
+              </a:spcBef>
+              <a:buNone/>
+            </a:pPr>
+            <a:r>
+              <a:rPr lang="de-DE" dirty="0"/>
+              <a:t>	</a:t>
+            </a:r>
+            <a:r>
+              <a:rPr lang="de-DE" dirty="0" smtClean="0"/>
+              <a:t>-&gt; Anpassungen müssen vorgenommen werden</a:t>
+            </a:r>
             <a:endParaRPr lang="de-DE" dirty="0"/>
           </a:p>
         </p:txBody>
@@ -7116,20 +7251,38 @@
         </p:nvSpPr>
         <p:spPr/>
         <p:txBody>
-          <a:bodyPr/>
-          <a:lstStyle/>
-          <a:p>
-            <a:r>
-              <a:rPr lang="de-DE" dirty="0" smtClean="0"/>
-              <a:t>Im zweiten Meilenstein sollte ein </a:t>
+          <a:bodyPr>
+            <a:normAutofit/>
+          </a:bodyPr>
+          <a:lstStyle/>
+          <a:p>
+            <a:r>
+              <a:rPr lang="de-DE" sz="2200" dirty="0" smtClean="0"/>
+              <a:t>Ziel</a:t>
+            </a:r>
+            <a:r>
+              <a:rPr lang="de-DE" dirty="0" smtClean="0"/>
+              <a:t>:</a:t>
+            </a:r>
+          </a:p>
+          <a:p>
+            <a:pPr marL="45720" indent="0">
+              <a:spcBef>
+                <a:spcPts val="0"/>
+              </a:spcBef>
+              <a:buNone/>
+            </a:pPr>
+            <a:r>
+              <a:rPr lang="de-DE" dirty="0" smtClean="0"/>
+              <a:t>               -Erstellen eines </a:t>
             </a:r>
             <a:r>
               <a:rPr lang="de-DE" dirty="0" err="1" smtClean="0"/>
-              <a:t>Fixture</a:t>
-            </a:r>
-            <a:r>
-              <a:rPr lang="de-DE" dirty="0" smtClean="0"/>
-              <a:t> geschrieben werden, welches die Tests in </a:t>
+              <a:t>Fixtures</a:t>
+            </a:r>
+            <a:r>
+              <a:rPr lang="de-DE" dirty="0" smtClean="0"/>
+              <a:t>, welches die Tests in </a:t>
             </a:r>
             <a:r>
               <a:rPr lang="de-DE" dirty="0" err="1" smtClean="0"/>
@@ -7137,20 +7290,38 @@
             </a:r>
             <a:r>
               <a:rPr lang="de-DE" dirty="0" smtClean="0"/>
-              <a:t> aus dem Testeditor herausstartet. </a:t>
-            </a:r>
-          </a:p>
-          <a:p>
-            <a:r>
-              <a:rPr lang="de-DE" dirty="0" smtClean="0"/>
-              <a:t>Genauso musste der Inspektor so angepasst werden, dass es die Möglichkeit gab aus den vorhandenen Daten einen </a:t>
+              <a:t> aus dem </a:t>
+            </a:r>
+            <a:r>
+              <a:rPr lang="de-DE" dirty="0" err="1" smtClean="0"/>
+              <a:t>TestEditor</a:t>
+            </a:r>
+            <a:r>
+              <a:rPr lang="de-DE" dirty="0" smtClean="0"/>
+              <a:t>    	   	 herausstarten</a:t>
+            </a:r>
+          </a:p>
+          <a:p>
+            <a:pPr marL="45720" indent="0">
+              <a:spcBef>
+                <a:spcPts val="0"/>
+              </a:spcBef>
+              <a:buNone/>
+            </a:pPr>
+            <a:r>
+              <a:rPr lang="de-DE" dirty="0"/>
+              <a:t> </a:t>
+            </a:r>
+            <a:r>
+              <a:rPr lang="de-DE" dirty="0" smtClean="0"/>
+              <a:t> 	-Anpassung des Inspektors, sodass aus den vorhandenen Daten ein  	  	 </a:t>
             </a:r>
             <a:r>
               <a:rPr lang="de-DE" dirty="0" err="1" smtClean="0"/>
               <a:t>Classification</a:t>
             </a:r>
             <a:r>
-              <a:rPr lang="de-DE" dirty="0"/>
+              <a:rPr lang="de-DE" dirty="0" smtClean="0"/>
               <a:t> </a:t>
             </a:r>
             <a:r>
@@ -7159,58 +7330,130 @@
             </a:r>
             <a:r>
               <a:rPr lang="de-DE" dirty="0" smtClean="0"/>
-              <a:t> zu erstellen. </a:t>
-            </a:r>
-          </a:p>
-          <a:p>
-            <a:r>
-              <a:rPr lang="de-DE" dirty="0" smtClean="0"/>
-              <a:t>Auch hier gab es einige Hürden </a:t>
-            </a:r>
-          </a:p>
-          <a:p>
-            <a:pPr lvl="1"/>
-            <a:r>
-              <a:rPr lang="de-DE" dirty="0" smtClean="0"/>
-              <a:t>die Dokumentation zu Erstellung des </a:t>
-            </a:r>
-            <a:r>
-              <a:rPr lang="de-DE" dirty="0" err="1" smtClean="0"/>
+              <a:t> erstellt werden kann</a:t>
+            </a:r>
+          </a:p>
+          <a:p>
+            <a:pPr marL="45720" indent="0">
+              <a:spcBef>
+                <a:spcPts val="0"/>
+              </a:spcBef>
+              <a:buNone/>
+            </a:pPr>
+            <a:endParaRPr lang="de-DE" dirty="0" smtClean="0"/>
+          </a:p>
+          <a:p>
+            <a:pPr>
+              <a:spcBef>
+                <a:spcPts val="0"/>
+              </a:spcBef>
+            </a:pPr>
+            <a:r>
+              <a:rPr lang="de-DE" sz="2200" dirty="0" smtClean="0"/>
+              <a:t>Hürden</a:t>
+            </a:r>
+            <a:r>
+              <a:rPr lang="de-DE" dirty="0" smtClean="0"/>
+              <a:t>:</a:t>
+            </a:r>
+          </a:p>
+          <a:p>
+            <a:pPr marL="685800" lvl="2" indent="0">
+              <a:spcBef>
+                <a:spcPts val="0"/>
+              </a:spcBef>
+              <a:buNone/>
+            </a:pPr>
+            <a:r>
+              <a:rPr lang="de-DE" sz="2000" dirty="0"/>
+              <a:t>	</a:t>
+            </a:r>
+            <a:r>
+              <a:rPr lang="de-DE" sz="2000" dirty="0" smtClean="0"/>
+              <a:t>-Dokumentation zur Erstellung des </a:t>
+            </a:r>
+            <a:r>
+              <a:rPr lang="de-DE" sz="2000" dirty="0" err="1" smtClean="0"/>
+              <a:t>Fixtures</a:t>
+            </a:r>
+            <a:r>
+              <a:rPr lang="de-DE" sz="2000" dirty="0" smtClean="0"/>
+              <a:t> ist veraltet</a:t>
+            </a:r>
+          </a:p>
+          <a:p>
+            <a:pPr marL="685800" lvl="2" indent="0">
+              <a:spcBef>
+                <a:spcPts val="0"/>
+              </a:spcBef>
+              <a:buNone/>
+            </a:pPr>
+            <a:r>
+              <a:rPr lang="de-DE" sz="2000" dirty="0"/>
+              <a:t> </a:t>
+            </a:r>
+            <a:r>
+              <a:rPr lang="de-DE" sz="2000" dirty="0" smtClean="0"/>
+              <a:t>   -Debuggen durch </a:t>
+            </a:r>
+            <a:r>
+              <a:rPr lang="de-DE" sz="2000" dirty="0" err="1" smtClean="0"/>
+              <a:t>unpräziese</a:t>
+            </a:r>
+            <a:r>
+              <a:rPr lang="de-DE" sz="2000" dirty="0" smtClean="0"/>
+              <a:t> Fehlermeldungen schwierig </a:t>
+            </a:r>
+          </a:p>
+          <a:p>
+            <a:pPr marL="685800" lvl="2" indent="0">
+              <a:spcBef>
+                <a:spcPts val="0"/>
+              </a:spcBef>
+              <a:buNone/>
+            </a:pPr>
+            <a:endParaRPr lang="de-DE" sz="2000" dirty="0"/>
+          </a:p>
+          <a:p>
+            <a:pPr marL="685800" lvl="2" indent="0">
+              <a:spcBef>
+                <a:spcPts val="0"/>
+              </a:spcBef>
+              <a:buNone/>
+            </a:pPr>
+            <a:r>
+              <a:rPr lang="de-DE" sz="2000" dirty="0" smtClean="0"/>
+              <a:t>-&gt;auf ein existierendes </a:t>
+            </a:r>
+            <a:r>
+              <a:rPr lang="de-DE" sz="2000" dirty="0" err="1" smtClean="0"/>
               <a:t>Fixture</a:t>
             </a:r>
             <a:r>
-              <a:rPr lang="de-DE" dirty="0" smtClean="0"/>
-              <a:t> ist veraltet, so dass es nur durch ausprobieren zum Erfolg führte.</a:t>
-            </a:r>
-          </a:p>
-          <a:p>
-            <a:pPr lvl="1"/>
-            <a:r>
-              <a:rPr lang="de-DE" dirty="0" smtClean="0"/>
-              <a:t>Durch irreführende Fehlermeldungen war das Debuggen schwierig.</a:t>
-            </a:r>
-          </a:p>
-          <a:p>
-            <a:r>
-              <a:rPr lang="de-DE" dirty="0"/>
-              <a:t>Zur Lösung der Hürden wurden auf ein existierendes </a:t>
-            </a:r>
-            <a:r>
-              <a:rPr lang="de-DE" dirty="0" err="1"/>
+              <a:rPr lang="de-DE" sz="2000" dirty="0" smtClean="0"/>
+              <a:t> wurde zurückgegriffen</a:t>
+            </a:r>
+          </a:p>
+          <a:p>
+            <a:pPr marL="685800" lvl="2" indent="0">
+              <a:spcBef>
+                <a:spcPts val="0"/>
+              </a:spcBef>
+              <a:buNone/>
+            </a:pPr>
+            <a:r>
+              <a:rPr lang="de-DE" sz="2000" dirty="0" smtClean="0"/>
+              <a:t>-&gt;durch das original Repository war es möglich ein Core-</a:t>
+            </a:r>
+            <a:r>
+              <a:rPr lang="de-DE" sz="2000" dirty="0" err="1" smtClean="0"/>
               <a:t>Fixture</a:t>
             </a:r>
             <a:r>
-              <a:rPr lang="de-DE" dirty="0"/>
-              <a:t> zurückgegriffen. Erst durch das original Repository war es möglich eine neues Core-</a:t>
-            </a:r>
-            <a:r>
-              <a:rPr lang="de-DE" dirty="0" err="1"/>
-              <a:t>Fixture</a:t>
-            </a:r>
-            <a:r>
-              <a:rPr lang="de-DE" dirty="0"/>
-              <a:t> zu schreiben.</a:t>
-            </a:r>
+              <a:rPr lang="de-DE" sz="2000" dirty="0" smtClean="0"/>
+              <a:t> zu implementieren</a:t>
+            </a:r>
+            <a:endParaRPr lang="de-DE" sz="2000" dirty="0" smtClean="0"/>
           </a:p>
           <a:p>
             <a:endParaRPr lang="de-DE" dirty="0"/>

</xml_diff>

<commit_message>
Negativpunkte von Testeditor Anpassung Aufzählungen Schriftgrößen aneinander angepasst
</commit_message>
<xml_diff>
--- a/TestenMileStone3.pptx
+++ b/TestenMileStone3.pptx
@@ -226,7 +226,7 @@
           <a:p>
             <a:fld id="{65DD71D7-55AC-46BD-81B3-09AB2F9EFBD8}" type="datetimeFigureOut">
               <a:rPr lang="de-DE" smtClean="0"/>
-              <a:t>10.01.2016</a:t>
+              <a:t>tt.01.jjjj</a:t>
             </a:fld>
             <a:endParaRPr lang="de-DE" dirty="0"/>
           </a:p>
@@ -391,7 +391,7 @@
           <a:p>
             <a:fld id="{1F89424F-BB59-4F4E-9822-4CA3E770FFD2}" type="datetimeFigureOut">
               <a:rPr lang="de-DE" smtClean="0"/>
-              <a:t>10.01.2016</a:t>
+              <a:t>tt.01.jjjj</a:t>
             </a:fld>
             <a:endParaRPr lang="de-DE" dirty="0"/>
           </a:p>
@@ -1202,7 +1202,7 @@
           <a:p>
             <a:fld id="{8AE61375-67D6-420B-86AE-DA020D70A190}" type="datetime1">
               <a:rPr lang="de-DE" smtClean="0"/>
-              <a:t>10.01.2016</a:t>
+              <a:t>tt.01.jjjj</a:t>
             </a:fld>
             <a:endParaRPr lang="de-DE" dirty="0"/>
           </a:p>
@@ -1398,7 +1398,7 @@
           <a:p>
             <a:fld id="{4C3CB006-1C8F-4FFF-9886-C7F4371DAF23}" type="datetime1">
               <a:rPr lang="de-DE" smtClean="0"/>
-              <a:t>10.01.2016</a:t>
+              <a:t>tt.01.jjjj</a:t>
             </a:fld>
             <a:endParaRPr lang="de-DE" dirty="0"/>
           </a:p>
@@ -1584,7 +1584,7 @@
           <a:p>
             <a:fld id="{D321307D-809D-48F8-91EE-9AA8198446F8}" type="datetime1">
               <a:rPr lang="de-DE" smtClean="0"/>
-              <a:t>10.01.2016</a:t>
+              <a:t>tt.01.jjjj</a:t>
             </a:fld>
             <a:endParaRPr lang="de-DE" dirty="0"/>
           </a:p>
@@ -2183,7 +2183,7 @@
           <a:p>
             <a:fld id="{7F2630C1-7A3F-498A-B70C-5B81638D9A90}" type="datetime1">
               <a:rPr lang="de-DE" smtClean="0"/>
-              <a:t>10.01.2016</a:t>
+              <a:t>tt.01.jjjj</a:t>
             </a:fld>
             <a:endParaRPr lang="de-DE" dirty="0"/>
           </a:p>
@@ -2631,7 +2631,7 @@
           <a:p>
             <a:fld id="{073F4EA5-F2B1-4A30-B391-9C13E4EB1066}" type="datetime1">
               <a:rPr lang="de-DE" smtClean="0"/>
-              <a:t>10.01.2016</a:t>
+              <a:t>tt.01.jjjj</a:t>
             </a:fld>
             <a:endParaRPr lang="de-DE" dirty="0"/>
           </a:p>
@@ -2765,7 +2765,7 @@
           <a:p>
             <a:fld id="{D6A603CA-3662-4A3A-83DC-758F233EE0F1}" type="datetime1">
               <a:rPr lang="de-DE" smtClean="0"/>
-              <a:t>10.01.2016</a:t>
+              <a:t>tt.01.jjjj</a:t>
             </a:fld>
             <a:endParaRPr lang="de-DE" dirty="0"/>
           </a:p>
@@ -2876,7 +2876,7 @@
           <a:p>
             <a:fld id="{C78925BB-189B-4468-A51B-FBC34BAEE2A3}" type="datetime1">
               <a:rPr lang="de-DE" smtClean="0"/>
-              <a:t>10.01.2016</a:t>
+              <a:t>tt.01.jjjj</a:t>
             </a:fld>
             <a:endParaRPr lang="de-DE" dirty="0"/>
           </a:p>
@@ -3305,7 +3305,7 @@
           <a:p>
             <a:fld id="{A4A24417-A66A-4DB9-A411-86E6167B556E}" type="datetime1">
               <a:rPr lang="de-DE" smtClean="0"/>
-              <a:t>10.01.2016</a:t>
+              <a:t>tt.01.jjjj</a:t>
             </a:fld>
             <a:endParaRPr lang="de-DE" dirty="0"/>
           </a:p>
@@ -3724,7 +3724,7 @@
           <a:p>
             <a:fld id="{2B5E8D1E-9E6B-4DE7-806A-E0D9A440D85A}" type="datetime1">
               <a:rPr lang="de-DE" smtClean="0"/>
-              <a:t>10.01.2016</a:t>
+              <a:t>tt.01.jjjj</a:t>
             </a:fld>
             <a:endParaRPr lang="de-DE" dirty="0"/>
           </a:p>
@@ -4001,7 +4001,7 @@
           <a:p>
             <a:fld id="{76EFFB5E-0A4E-4527-8E61-46DE082A53B6}" type="datetime1">
               <a:rPr lang="de-DE" smtClean="0"/>
-              <a:t>10.01.2016</a:t>
+              <a:t>tt.01.jjjj</a:t>
             </a:fld>
             <a:endParaRPr lang="de-DE" dirty="0"/>
           </a:p>
@@ -6419,7 +6419,7 @@
           <a:p>
             <a:r>
               <a:rPr lang="de-DE" dirty="0" smtClean="0"/>
-              <a:t>Aufgezählten Hürden komplizierten das Projekt</a:t>
+              <a:t>Genannte Hürden verkomplizierten Projekt</a:t>
             </a:r>
             <a:endParaRPr lang="de-DE" dirty="0"/>
           </a:p>
@@ -6430,20 +6430,50 @@
             </a:r>
             <a:r>
               <a:rPr lang="de-DE" dirty="0" smtClean="0"/>
-              <a:t>wurde </a:t>
+              <a:t>guter </a:t>
             </a:r>
             <a:r>
               <a:rPr lang="de-DE" dirty="0" smtClean="0"/>
-              <a:t>ein </a:t>
+              <a:t>Einblick in </a:t>
             </a:r>
             <a:r>
               <a:rPr lang="de-DE" dirty="0" smtClean="0"/>
-              <a:t>guter Einblick in die verschiedenen Testprogramm </a:t>
-            </a:r>
+              <a:t>verschiedenen Teile des Testzyklus</a:t>
+            </a:r>
+          </a:p>
+          <a:p>
             <a:r>
               <a:rPr lang="de-DE" dirty="0" smtClean="0"/>
-              <a:t>gewährt</a:t>
-            </a:r>
+              <a:t>Implementation von Schnittstellen zur Kommunikation zwischen mehreren Tools</a:t>
+            </a:r>
+          </a:p>
+          <a:p>
+            <a:r>
+              <a:rPr lang="de-DE" dirty="0" smtClean="0"/>
+              <a:t>Erstellen von </a:t>
+            </a:r>
+            <a:r>
+              <a:rPr lang="de-DE" dirty="0" err="1" smtClean="0"/>
+              <a:t>Classification</a:t>
+            </a:r>
+            <a:r>
+              <a:rPr lang="de-DE" dirty="0" smtClean="0"/>
+              <a:t> </a:t>
+            </a:r>
+            <a:r>
+              <a:rPr lang="de-DE" dirty="0" err="1" smtClean="0"/>
+              <a:t>Trees</a:t>
+            </a:r>
+            <a:r>
+              <a:rPr lang="de-DE" dirty="0" smtClean="0"/>
+              <a:t> + Generierung von Testfällen</a:t>
+            </a:r>
+            <a:endParaRPr lang="de-DE" dirty="0" smtClean="0"/>
+          </a:p>
+          <a:p>
+            <a:endParaRPr lang="de-DE" dirty="0" smtClean="0"/>
+          </a:p>
+          <a:p>
             <a:endParaRPr lang="de-DE" dirty="0" smtClean="0"/>
           </a:p>
         </p:txBody>
@@ -6805,102 +6835,284 @@
       </p:sp>
       <p:sp>
         <p:nvSpPr>
-          <p:cNvPr id="7" name="Textfeld 6"/>
-          <p:cNvSpPr txBox="1"/>
+          <p:cNvPr id="8" name="Inhaltsplatzhalter 2"/>
+          <p:cNvSpPr txBox="1">
+            <a:spLocks/>
+          </p:cNvSpPr>
           <p:nvPr/>
         </p:nvSpPr>
         <p:spPr>
           <a:xfrm>
-            <a:off x="1295400" y="1806423"/>
-            <a:ext cx="4590092" cy="2092881"/>
+            <a:off x="1295399" y="1704836"/>
+            <a:ext cx="4590093" cy="4114800"/>
           </a:xfrm>
           <a:prstGeom prst="rect">
             <a:avLst/>
           </a:prstGeom>
-          <a:noFill/>
         </p:spPr>
         <p:txBody>
-          <a:bodyPr wrap="square" rtlCol="0">
-            <a:spAutoFit/>
+          <a:bodyPr vert="horz" lIns="91440" tIns="45720" rIns="91440" bIns="45720" rtlCol="0">
+            <a:normAutofit/>
           </a:bodyPr>
-          <a:lstStyle/>
-          <a:p>
-            <a:pPr marL="285750" indent="-285750">
-              <a:buFont typeface="Arial" panose="020B0604020202020204" pitchFamily="34" charset="0"/>
+          <a:lstStyle>
+            <a:lvl1pPr marL="274320" indent="-228600" algn="l" defTabSz="914400" rtl="0" eaLnBrk="1" latinLnBrk="0" hangingPunct="1">
+              <a:lnSpc>
+                <a:spcPct val="90000"/>
+              </a:lnSpc>
+              <a:spcBef>
+                <a:spcPts val="1800"/>
+              </a:spcBef>
+              <a:buClr>
+                <a:schemeClr val="accent1"/>
+              </a:buClr>
+              <a:buFont typeface="Arial" pitchFamily="34" charset="0"/>
               <a:buChar char="•"/>
-            </a:pPr>
-            <a:r>
-              <a:rPr lang="de-DE" sz="2000" dirty="0" smtClean="0"/>
-              <a:t>Ziel</a:t>
-            </a:r>
-            <a:r>
-              <a:rPr lang="de-DE" dirty="0" smtClean="0"/>
-              <a:t>: </a:t>
-            </a:r>
-          </a:p>
-          <a:p>
+              <a:defRPr sz="2000" kern="1200">
+                <a:solidFill>
+                  <a:schemeClr val="tx1"/>
+                </a:solidFill>
+                <a:latin typeface="+mn-lt"/>
+                <a:ea typeface="+mn-ea"/>
+                <a:cs typeface="+mn-cs"/>
+              </a:defRPr>
+            </a:lvl1pPr>
+            <a:lvl2pPr marL="594360" indent="-228600" algn="l" defTabSz="914400" rtl="0" eaLnBrk="1" latinLnBrk="0" hangingPunct="1">
+              <a:lnSpc>
+                <a:spcPct val="90000"/>
+              </a:lnSpc>
+              <a:spcBef>
+                <a:spcPts val="1000"/>
+              </a:spcBef>
+              <a:buClr>
+                <a:schemeClr val="accent1"/>
+              </a:buClr>
+              <a:buFont typeface="Arial" pitchFamily="34" charset="0"/>
+              <a:buChar char="•"/>
+              <a:defRPr sz="1800" kern="1200">
+                <a:solidFill>
+                  <a:schemeClr val="tx1"/>
+                </a:solidFill>
+                <a:latin typeface="+mn-lt"/>
+                <a:ea typeface="+mn-ea"/>
+                <a:cs typeface="+mn-cs"/>
+              </a:defRPr>
+            </a:lvl2pPr>
+            <a:lvl3pPr marL="914400" indent="-228600" algn="l" defTabSz="914400" rtl="0" eaLnBrk="1" latinLnBrk="0" hangingPunct="1">
+              <a:lnSpc>
+                <a:spcPct val="90000"/>
+              </a:lnSpc>
+              <a:spcBef>
+                <a:spcPts val="800"/>
+              </a:spcBef>
+              <a:buClr>
+                <a:schemeClr val="accent1"/>
+              </a:buClr>
+              <a:buFont typeface="Arial" pitchFamily="34" charset="0"/>
+              <a:buChar char="•"/>
+              <a:defRPr sz="1600" kern="1200">
+                <a:solidFill>
+                  <a:schemeClr val="tx1"/>
+                </a:solidFill>
+                <a:latin typeface="+mn-lt"/>
+                <a:ea typeface="+mn-ea"/>
+                <a:cs typeface="+mn-cs"/>
+              </a:defRPr>
+            </a:lvl3pPr>
+            <a:lvl4pPr marL="1234440" indent="-228600" algn="l" defTabSz="914400" rtl="0" eaLnBrk="1" latinLnBrk="0" hangingPunct="1">
+              <a:lnSpc>
+                <a:spcPct val="90000"/>
+              </a:lnSpc>
+              <a:spcBef>
+                <a:spcPts val="800"/>
+              </a:spcBef>
+              <a:buClr>
+                <a:schemeClr val="accent1"/>
+              </a:buClr>
+              <a:buFont typeface="Arial" pitchFamily="34" charset="0"/>
+              <a:buChar char="•"/>
+              <a:defRPr sz="1400" kern="1200">
+                <a:solidFill>
+                  <a:schemeClr val="tx1"/>
+                </a:solidFill>
+                <a:latin typeface="+mn-lt"/>
+                <a:ea typeface="+mn-ea"/>
+                <a:cs typeface="+mn-cs"/>
+              </a:defRPr>
+            </a:lvl4pPr>
+            <a:lvl5pPr marL="1554480" indent="-228600" algn="l" defTabSz="914400" rtl="0" eaLnBrk="1" latinLnBrk="0" hangingPunct="1">
+              <a:lnSpc>
+                <a:spcPct val="90000"/>
+              </a:lnSpc>
+              <a:spcBef>
+                <a:spcPts val="800"/>
+              </a:spcBef>
+              <a:buClr>
+                <a:schemeClr val="accent1"/>
+              </a:buClr>
+              <a:buFont typeface="Arial" pitchFamily="34" charset="0"/>
+              <a:buChar char="•"/>
+              <a:defRPr sz="1400" kern="1200">
+                <a:solidFill>
+                  <a:schemeClr val="tx1"/>
+                </a:solidFill>
+                <a:latin typeface="+mn-lt"/>
+                <a:ea typeface="+mn-ea"/>
+                <a:cs typeface="+mn-cs"/>
+              </a:defRPr>
+            </a:lvl5pPr>
+            <a:lvl6pPr marL="1828800" indent="-228600" algn="l" defTabSz="914400" rtl="0" eaLnBrk="1" latinLnBrk="0" hangingPunct="1">
+              <a:lnSpc>
+                <a:spcPct val="90000"/>
+              </a:lnSpc>
+              <a:spcBef>
+                <a:spcPts val="800"/>
+              </a:spcBef>
+              <a:buClr>
+                <a:schemeClr val="accent1"/>
+              </a:buClr>
+              <a:buFont typeface="Arial" pitchFamily="34" charset="0"/>
+              <a:buChar char="•"/>
+              <a:defRPr sz="1400" kern="1200">
+                <a:solidFill>
+                  <a:schemeClr val="tx1"/>
+                </a:solidFill>
+                <a:latin typeface="+mn-lt"/>
+                <a:ea typeface="+mn-ea"/>
+                <a:cs typeface="+mn-cs"/>
+              </a:defRPr>
+            </a:lvl6pPr>
+            <a:lvl7pPr marL="2103120" indent="-228600" algn="l" defTabSz="914400" rtl="0" eaLnBrk="1" latinLnBrk="0" hangingPunct="1">
+              <a:lnSpc>
+                <a:spcPct val="90000"/>
+              </a:lnSpc>
+              <a:spcBef>
+                <a:spcPts val="800"/>
+              </a:spcBef>
+              <a:buClr>
+                <a:schemeClr val="accent1"/>
+              </a:buClr>
+              <a:buFont typeface="Arial" pitchFamily="34" charset="0"/>
+              <a:buChar char="•"/>
+              <a:defRPr sz="1400" kern="1200">
+                <a:solidFill>
+                  <a:schemeClr val="tx1"/>
+                </a:solidFill>
+                <a:latin typeface="+mn-lt"/>
+                <a:ea typeface="+mn-ea"/>
+                <a:cs typeface="+mn-cs"/>
+              </a:defRPr>
+            </a:lvl7pPr>
+            <a:lvl8pPr marL="2377440" indent="-228600" algn="l" defTabSz="914400" rtl="0" eaLnBrk="1" latinLnBrk="0" hangingPunct="1">
+              <a:lnSpc>
+                <a:spcPct val="90000"/>
+              </a:lnSpc>
+              <a:spcBef>
+                <a:spcPts val="800"/>
+              </a:spcBef>
+              <a:buClr>
+                <a:schemeClr val="accent1"/>
+              </a:buClr>
+              <a:buFont typeface="Arial" pitchFamily="34" charset="0"/>
+              <a:buChar char="•"/>
+              <a:defRPr sz="1400" kern="1200">
+                <a:solidFill>
+                  <a:schemeClr val="tx1"/>
+                </a:solidFill>
+                <a:latin typeface="+mn-lt"/>
+                <a:ea typeface="+mn-ea"/>
+                <a:cs typeface="+mn-cs"/>
+              </a:defRPr>
+            </a:lvl8pPr>
+            <a:lvl9pPr marL="2651760" indent="-228600" algn="l" defTabSz="914400" rtl="0" eaLnBrk="1" latinLnBrk="0" hangingPunct="1">
+              <a:lnSpc>
+                <a:spcPct val="90000"/>
+              </a:lnSpc>
+              <a:spcBef>
+                <a:spcPts val="800"/>
+              </a:spcBef>
+              <a:buClr>
+                <a:schemeClr val="accent1"/>
+              </a:buClr>
+              <a:buFont typeface="Arial" pitchFamily="34" charset="0"/>
+              <a:buChar char="•"/>
+              <a:defRPr sz="1400" kern="1200">
+                <a:solidFill>
+                  <a:schemeClr val="tx1"/>
+                </a:solidFill>
+                <a:latin typeface="+mn-lt"/>
+                <a:ea typeface="+mn-ea"/>
+                <a:cs typeface="+mn-cs"/>
+              </a:defRPr>
+            </a:lvl9pPr>
+          </a:lstStyle>
+          <a:p>
+            <a:pPr marL="285750" indent="-285750"/>
+            <a:r>
+              <a:rPr lang="de-DE" sz="2200" dirty="0"/>
+              <a:t>Ziel:</a:t>
+            </a:r>
             <a:r>
               <a:rPr lang="de-DE" dirty="0"/>
               <a:t> </a:t>
             </a:r>
+            <a:endParaRPr lang="de-DE" dirty="0" smtClean="0"/>
+          </a:p>
+          <a:p>
+            <a:pPr marL="605790" lvl="1" indent="-285750"/>
+            <a:r>
+              <a:rPr lang="de-DE" sz="2000" dirty="0" smtClean="0"/>
+              <a:t>Kreislauf</a:t>
+            </a:r>
             <a:r>
               <a:rPr lang="de-DE" dirty="0" smtClean="0"/>
-              <a:t>   </a:t>
-            </a:r>
-            <a:r>
-              <a:rPr lang="de-DE" dirty="0" smtClean="0"/>
-              <a:t> Kreislauf zu schließen</a:t>
-            </a:r>
-          </a:p>
-          <a:p>
-            <a:endParaRPr lang="de-DE" dirty="0" smtClean="0"/>
-          </a:p>
-          <a:p>
-            <a:pPr marL="285750" indent="-285750">
-              <a:buFont typeface="Arial" panose="020B0604020202020204" pitchFamily="34" charset="0"/>
-              <a:buChar char="•"/>
-            </a:pPr>
+              <a:t> schließen</a:t>
+            </a:r>
+            <a:endParaRPr lang="de-DE" dirty="0"/>
+          </a:p>
+          <a:p>
+            <a:pPr marL="285750" indent="-285750"/>
+            <a:r>
+              <a:rPr lang="de-DE" sz="2200" dirty="0" smtClean="0"/>
+              <a:t>Grundlage:</a:t>
+            </a:r>
+          </a:p>
+          <a:p>
+            <a:pPr marL="605790" lvl="1" indent="-285750"/>
+            <a:r>
+              <a:rPr lang="de-DE" dirty="0" err="1" smtClean="0"/>
+              <a:t>Ins</a:t>
+            </a:r>
+            <a:r>
+              <a:rPr lang="de-DE" sz="2000" dirty="0" err="1" smtClean="0"/>
+              <a:t>pector</a:t>
+            </a:r>
             <a:r>
               <a:rPr lang="de-DE" sz="2000" dirty="0" smtClean="0"/>
-              <a:t>Grundlage</a:t>
-            </a:r>
-            <a:r>
-              <a:rPr lang="de-DE" dirty="0" smtClean="0"/>
-              <a:t>:</a:t>
-            </a:r>
-          </a:p>
-          <a:p>
-            <a:r>
-              <a:rPr lang="de-DE" dirty="0" smtClean="0"/>
-              <a:t>                   - </a:t>
+              <a:t> </a:t>
+            </a:r>
+            <a:r>
+              <a:rPr lang="de-DE" sz="2000" dirty="0"/>
+              <a:t>aus </a:t>
+            </a:r>
+            <a:r>
+              <a:rPr lang="de-DE" sz="2000" dirty="0" smtClean="0"/>
+              <a:t>Vorsemester</a:t>
+            </a:r>
+          </a:p>
+          <a:p>
+            <a:pPr marL="605790" lvl="1" indent="-285750"/>
+            <a:r>
+              <a:rPr lang="de-DE" sz="2000" dirty="0" err="1" smtClean="0"/>
+              <a:t>Ap</a:t>
             </a:r>
             <a:r>
               <a:rPr lang="de-DE" dirty="0" err="1" smtClean="0"/>
-              <a:t>Inspector</a:t>
-            </a:r>
-            <a:r>
-              <a:rPr lang="de-DE" dirty="0" smtClean="0"/>
-              <a:t> </a:t>
-            </a:r>
-            <a:r>
-              <a:rPr lang="de-DE" dirty="0" smtClean="0"/>
-              <a:t>aus dem Vorsemester </a:t>
-            </a:r>
-            <a:r>
-              <a:rPr lang="de-DE" dirty="0" smtClean="0"/>
-              <a:t>              	 - </a:t>
-            </a:r>
-            <a:r>
-              <a:rPr lang="de-DE" dirty="0" err="1" smtClean="0"/>
-              <a:t>Appium</a:t>
-            </a:r>
-            <a:endParaRPr lang="de-DE" dirty="0" smtClean="0"/>
-          </a:p>
-          <a:p>
-            <a:pPr marL="285750" indent="-285750">
-              <a:buFont typeface="Arial" panose="020B0604020202020204" pitchFamily="34" charset="0"/>
-              <a:buChar char="•"/>
-            </a:pPr>
+              <a:t>pium</a:t>
+            </a:r>
+            <a:endParaRPr lang="de-DE" dirty="0"/>
+          </a:p>
+          <a:p>
+            <a:pPr marL="285750" indent="-285750"/>
             <a:endParaRPr lang="de-DE" dirty="0"/>
           </a:p>
         </p:txBody>
@@ -6994,23 +7206,18 @@
           <a:p>
             <a:r>
               <a:rPr lang="de-DE" sz="2200" dirty="0" smtClean="0"/>
-              <a:t>Ziel</a:t>
+              <a:t>Ziel:</a:t>
+            </a:r>
+          </a:p>
+          <a:p>
+            <a:pPr lvl="1"/>
+            <a:r>
+              <a:rPr lang="de-DE" sz="2000" dirty="0" smtClean="0"/>
+              <a:t>Funktionsweise</a:t>
             </a:r>
             <a:r>
               <a:rPr lang="de-DE" dirty="0" smtClean="0"/>
-              <a:t>:</a:t>
-            </a:r>
-          </a:p>
-          <a:p>
-            <a:pPr marL="45720" indent="0">
-              <a:spcBef>
-                <a:spcPts val="0"/>
-              </a:spcBef>
-              <a:buNone/>
-            </a:pPr>
-            <a:r>
-              <a:rPr lang="de-DE" dirty="0" smtClean="0"/>
-              <a:t>              Funktionsweise </a:t>
+              <a:t> </a:t>
             </a:r>
             <a:r>
               <a:rPr lang="de-DE" dirty="0" smtClean="0"/>
@@ -7018,8 +7225,9 @@
             </a:r>
             <a:r>
               <a:rPr lang="de-DE" dirty="0" smtClean="0"/>
-              <a:t>Programme zu verstehen</a:t>
-            </a:r>
+              <a:t>Programme verstehen</a:t>
+            </a:r>
+            <a:endParaRPr lang="de-DE" dirty="0" smtClean="0"/>
           </a:p>
           <a:p>
             <a:pPr>
@@ -7029,93 +7237,101 @@
             </a:pPr>
             <a:r>
               <a:rPr lang="de-DE" sz="2200" dirty="0" smtClean="0"/>
-              <a:t>Probleme</a:t>
-            </a:r>
-            <a:r>
-              <a:rPr lang="de-DE" dirty="0" smtClean="0"/>
-              <a:t>:</a:t>
-            </a:r>
-          </a:p>
-          <a:p>
-            <a:pPr marL="45720" indent="0">
+              <a:t>Probleme:</a:t>
+            </a:r>
+          </a:p>
+          <a:p>
+            <a:pPr lvl="1">
               <a:spcBef>
                 <a:spcPts val="0"/>
               </a:spcBef>
-              <a:buNone/>
             </a:pPr>
             <a:r>
               <a:rPr lang="de-DE" dirty="0" smtClean="0"/>
-              <a:t>	Timeout bei Inaktivität in </a:t>
-            </a:r>
-            <a:r>
-              <a:rPr lang="de-DE" dirty="0" err="1" smtClean="0"/>
+              <a:t>Ti</a:t>
+            </a:r>
+            <a:r>
+              <a:rPr lang="de-DE" sz="2000" dirty="0" smtClean="0"/>
+              <a:t>meout </a:t>
+            </a:r>
+            <a:r>
+              <a:rPr lang="de-DE" sz="2000" dirty="0" smtClean="0"/>
+              <a:t>bei Inaktivität in </a:t>
+            </a:r>
+            <a:r>
+              <a:rPr lang="de-DE" sz="2000" dirty="0" err="1" smtClean="0"/>
               <a:t>Appium</a:t>
             </a:r>
             <a:r>
-              <a:rPr lang="de-DE" dirty="0" smtClean="0"/>
+              <a:rPr lang="de-DE" sz="2000" dirty="0" smtClean="0"/>
               <a:t> </a:t>
             </a:r>
-            <a:r>
-              <a:rPr lang="de-DE" dirty="0"/>
-              <a:t>	</a:t>
-            </a:r>
-            <a:endParaRPr lang="de-DE" dirty="0" smtClean="0"/>
-          </a:p>
-          <a:p>
-            <a:pPr marL="45720" indent="0">
+            <a:endParaRPr lang="de-DE" sz="2000" dirty="0"/>
+          </a:p>
+          <a:p>
+            <a:pPr lvl="2">
               <a:spcBef>
                 <a:spcPts val="0"/>
               </a:spcBef>
-              <a:buNone/>
             </a:pPr>
             <a:r>
-              <a:rPr lang="de-DE" dirty="0"/>
-              <a:t>	</a:t>
-            </a:r>
-            <a:r>
-              <a:rPr lang="de-DE" dirty="0" smtClean="0"/>
-              <a:t>-&gt; problematisch für langsame Computer</a:t>
-            </a:r>
-            <a:endParaRPr lang="de-DE" dirty="0"/>
-          </a:p>
-          <a:p>
-            <a:pPr marL="45720" indent="0">
+              <a:rPr lang="de-DE" sz="1800" dirty="0" smtClean="0"/>
+              <a:t>problematisch </a:t>
+            </a:r>
+            <a:r>
+              <a:rPr lang="de-DE" sz="1800" dirty="0" smtClean="0"/>
+              <a:t>für langsame </a:t>
+            </a:r>
+            <a:r>
+              <a:rPr lang="de-DE" sz="1800" dirty="0" smtClean="0"/>
+              <a:t>Computer</a:t>
+            </a:r>
+            <a:endParaRPr lang="de-DE" sz="1800" dirty="0"/>
+          </a:p>
+          <a:p>
+            <a:pPr lvl="1">
               <a:spcBef>
                 <a:spcPts val="0"/>
               </a:spcBef>
-              <a:buNone/>
             </a:pPr>
             <a:r>
-              <a:rPr lang="de-DE" dirty="0"/>
-              <a:t>	</a:t>
-            </a:r>
-            <a:r>
-              <a:rPr lang="de-DE" dirty="0" smtClean="0"/>
-              <a:t>veraltete Beispiel </a:t>
-            </a:r>
-            <a:r>
-              <a:rPr lang="de-DE" dirty="0" err="1" smtClean="0"/>
+              <a:rPr lang="de-DE" sz="2000" dirty="0" smtClean="0"/>
+              <a:t>veraltete </a:t>
+            </a:r>
+            <a:r>
+              <a:rPr lang="de-DE" sz="2000" dirty="0" smtClean="0"/>
+              <a:t>Beispiel </a:t>
+            </a:r>
+            <a:r>
+              <a:rPr lang="de-DE" sz="2000" dirty="0" err="1" smtClean="0"/>
               <a:t>Webtests</a:t>
             </a:r>
             <a:r>
-              <a:rPr lang="de-DE" dirty="0" smtClean="0"/>
-              <a:t> bei dem Testeditor</a:t>
-            </a:r>
-          </a:p>
-          <a:p>
-            <a:pPr marL="45720" indent="0">
+              <a:rPr lang="de-DE" sz="2000" dirty="0" smtClean="0"/>
+              <a:t> bei dem </a:t>
+            </a:r>
+            <a:r>
+              <a:rPr lang="de-DE" sz="2000" dirty="0" smtClean="0"/>
+              <a:t>Testeditor</a:t>
+            </a:r>
+          </a:p>
+          <a:p>
+            <a:pPr lvl="2">
               <a:spcBef>
                 <a:spcPts val="0"/>
               </a:spcBef>
-              <a:buNone/>
             </a:pPr>
             <a:r>
-              <a:rPr lang="de-DE" dirty="0"/>
-              <a:t>	</a:t>
+              <a:rPr lang="de-DE" sz="1800" dirty="0" smtClean="0"/>
+              <a:t>An</a:t>
             </a:r>
             <a:r>
               <a:rPr lang="de-DE" dirty="0" smtClean="0"/>
-              <a:t>-&gt; Anpassungen müssen vorgenommen werden</a:t>
+              <a:t>passungen </a:t>
+            </a:r>
+            <a:r>
+              <a:rPr lang="de-DE" dirty="0" smtClean="0"/>
+              <a:t>müssen vorgenommen werden</a:t>
             </a:r>
             <a:endParaRPr lang="de-DE" dirty="0"/>
           </a:p>
@@ -7266,200 +7482,77 @@
             </a:r>
           </a:p>
           <a:p>
-            <a:pPr marL="45720" indent="0">
-              <a:spcBef>
-                <a:spcPts val="0"/>
-              </a:spcBef>
-              <a:buNone/>
-            </a:pPr>
-            <a:r>
-              <a:rPr lang="de-DE" dirty="0" smtClean="0"/>
-              <a:t>               -Erstellen eines </a:t>
-            </a:r>
-            <a:r>
-              <a:rPr lang="de-DE" dirty="0" err="1" smtClean="0"/>
-              <a:t>Fixtures</a:t>
-            </a:r>
-            <a:r>
-              <a:rPr lang="de-DE" dirty="0" smtClean="0"/>
-              <a:t>, welches die Tests in </a:t>
-            </a:r>
-            <a:r>
-              <a:rPr lang="de-DE" dirty="0" err="1" smtClean="0"/>
-              <a:t>Appium</a:t>
-            </a:r>
-            <a:r>
-              <a:rPr lang="de-DE" dirty="0" smtClean="0"/>
-              <a:t> aus dem </a:t>
-            </a:r>
-            <a:r>
-              <a:rPr lang="de-DE" dirty="0" err="1" smtClean="0"/>
-              <a:t>TestEditor</a:t>
-            </a:r>
-            <a:r>
-              <a:rPr lang="de-DE" dirty="0" smtClean="0"/>
-              <a:t>    	   	 herausstarten</a:t>
-            </a:r>
-          </a:p>
-          <a:p>
-            <a:pPr marL="45720" indent="0">
-              <a:spcBef>
-                <a:spcPts val="0"/>
-              </a:spcBef>
-              <a:buNone/>
-            </a:pPr>
-            <a:r>
-              <a:rPr lang="de-DE" dirty="0"/>
-              <a:t> </a:t>
-            </a:r>
-            <a:r>
-              <a:rPr lang="de-DE" dirty="0" smtClean="0"/>
-              <a:t> 	-Anpassung des Inspektors, sodass aus den vorhandenen Daten ein  	  	 </a:t>
-            </a:r>
-            <a:r>
-              <a:rPr lang="de-DE" dirty="0" err="1" smtClean="0"/>
-              <a:t>Classification</a:t>
-            </a:r>
-            <a:r>
-              <a:rPr lang="de-DE" dirty="0" smtClean="0"/>
-              <a:t> </a:t>
-            </a:r>
-            <a:r>
-              <a:rPr lang="de-DE" dirty="0" err="1" smtClean="0"/>
-              <a:t>Tree</a:t>
-            </a:r>
-            <a:r>
-              <a:rPr lang="de-DE" dirty="0" smtClean="0"/>
-              <a:t> erstellt werden kann</a:t>
-            </a:r>
-          </a:p>
-          <a:p>
-            <a:pPr marL="45720" indent="0">
-              <a:spcBef>
-                <a:spcPts val="0"/>
-              </a:spcBef>
-              <a:buNone/>
-            </a:pPr>
-            <a:endParaRPr lang="de-DE" dirty="0" smtClean="0"/>
-          </a:p>
-          <a:p>
-            <a:pPr>
-              <a:spcBef>
-                <a:spcPts val="0"/>
-              </a:spcBef>
-            </a:pPr>
-            <a:r>
-              <a:rPr lang="de-DE" sz="2200" dirty="0" smtClean="0"/>
-              <a:t>Hürden</a:t>
-            </a:r>
-            <a:r>
-              <a:rPr lang="de-DE" dirty="0" smtClean="0"/>
-              <a:t>:</a:t>
-            </a:r>
-          </a:p>
-          <a:p>
-            <a:pPr marL="685800" lvl="2" indent="0">
-              <a:spcBef>
-                <a:spcPts val="0"/>
-              </a:spcBef>
-              <a:buNone/>
-            </a:pPr>
-            <a:r>
-              <a:rPr lang="de-DE" sz="2000" dirty="0"/>
-              <a:t>	</a:t>
-            </a:r>
-            <a:r>
-              <a:rPr lang="de-DE" sz="2000" dirty="0" smtClean="0"/>
-              <a:t>-Dokumentation zur Erstellung des </a:t>
-            </a:r>
-            <a:r>
-              <a:rPr lang="de-DE" sz="2000" dirty="0" err="1" smtClean="0"/>
-              <a:t>Fixtures</a:t>
-            </a:r>
-            <a:r>
-              <a:rPr lang="de-DE" sz="2000" dirty="0" smtClean="0"/>
-              <a:t> ist veraltet</a:t>
-            </a:r>
-          </a:p>
-          <a:p>
-            <a:pPr marL="685800" lvl="2" indent="0">
-              <a:spcBef>
-                <a:spcPts val="0"/>
-              </a:spcBef>
-              <a:buNone/>
-            </a:pPr>
-            <a:r>
-              <a:rPr lang="de-DE" sz="2000" dirty="0"/>
-              <a:t> </a:t>
-            </a:r>
-            <a:r>
-              <a:rPr lang="de-DE" sz="2000" dirty="0" smtClean="0"/>
-              <a:t>   -Debuggen durch </a:t>
-            </a:r>
-            <a:r>
-              <a:rPr lang="de-DE" sz="2000" dirty="0" err="1" smtClean="0"/>
-              <a:t>unpräziese</a:t>
-            </a:r>
-            <a:r>
-              <a:rPr lang="de-DE" sz="2000" dirty="0" smtClean="0"/>
-              <a:t> Fehlermeldungen schwierig </a:t>
-            </a:r>
-          </a:p>
-          <a:p>
-            <a:pPr marL="685800" lvl="2" indent="0">
-              <a:spcBef>
-                <a:spcPts val="0"/>
-              </a:spcBef>
-              <a:buNone/>
-            </a:pPr>
-            <a:endParaRPr lang="de-DE" sz="2000" dirty="0"/>
-          </a:p>
-          <a:p>
-            <a:pPr marL="685800" lvl="2" indent="0">
-              <a:spcBef>
-                <a:spcPts val="0"/>
-              </a:spcBef>
-              <a:buNone/>
-            </a:pPr>
-            <a:r>
-              <a:rPr lang="de-DE" sz="2000" dirty="0" smtClean="0"/>
-              <a:t>-&gt;auf ein existierendes </a:t>
-            </a:r>
+            <a:pPr lvl="1"/>
             <a:r>
               <a:rPr lang="de-DE" sz="2000" dirty="0" err="1" smtClean="0"/>
               <a:t>Fixture</a:t>
             </a:r>
             <a:r>
               <a:rPr lang="de-DE" sz="2000" dirty="0" smtClean="0"/>
-              <a:t> wurde zurückgegriffen</a:t>
-            </a:r>
-          </a:p>
-          <a:p>
-            <a:pPr marL="685800" lvl="2" indent="0">
-              <a:spcBef>
-                <a:spcPts val="0"/>
-              </a:spcBef>
-              <a:buNone/>
-            </a:pPr>
+              <a:t> für Test Editor, um Tests via </a:t>
+            </a:r>
+            <a:r>
+              <a:rPr lang="de-DE" sz="2000" dirty="0" err="1" smtClean="0"/>
+              <a:t>Appium</a:t>
+            </a:r>
             <a:r>
               <a:rPr lang="de-DE" sz="2000" dirty="0" smtClean="0"/>
-              <a:t>-&gt;durch das original Repository war es möglich ein Core-</a:t>
+              <a:t> unter Android auszuführen</a:t>
+            </a:r>
+            <a:endParaRPr lang="de-DE" sz="2000" dirty="0" smtClean="0"/>
+          </a:p>
+          <a:p>
+            <a:pPr lvl="1"/>
+            <a:r>
+              <a:rPr lang="de-DE" sz="2000" dirty="0" smtClean="0"/>
+              <a:t>Anpassung </a:t>
             </a:r>
             <a:r>
               <a:rPr lang="de-DE" sz="2000" dirty="0" err="1" smtClean="0"/>
-              <a:t>Fixture</a:t>
+              <a:t>Inspector</a:t>
             </a:r>
             <a:r>
               <a:rPr lang="de-DE" sz="2000" dirty="0" smtClean="0"/>
-              <a:t> zu implementieren</a:t>
-            </a:r>
-            <a:endParaRPr lang="de-DE" sz="2000" dirty="0" smtClean="0"/>
-          </a:p>
-          <a:p>
-            <a:endParaRPr lang="de-DE" dirty="0"/>
-          </a:p>
-          <a:p>
-            <a:pPr lvl="1"/>
+              <a:t>, sodass aus App ein </a:t>
+            </a:r>
+            <a:r>
+              <a:rPr lang="de-DE" sz="2000" dirty="0" err="1" smtClean="0"/>
+              <a:t>Teilbaum</a:t>
+            </a:r>
+            <a:r>
+              <a:rPr lang="de-DE" sz="2000" dirty="0" smtClean="0"/>
+              <a:t> für </a:t>
+            </a:r>
+            <a:r>
+              <a:rPr lang="de-DE" sz="2000" dirty="0" err="1" smtClean="0"/>
+              <a:t>Classification</a:t>
+            </a:r>
+            <a:r>
+              <a:rPr lang="de-DE" sz="2000" dirty="0" smtClean="0"/>
+              <a:t> </a:t>
+            </a:r>
+            <a:r>
+              <a:rPr lang="de-DE" sz="2000" dirty="0" err="1" smtClean="0"/>
+              <a:t>Tree</a:t>
+            </a:r>
+            <a:r>
+              <a:rPr lang="de-DE" sz="2000" dirty="0" smtClean="0"/>
+              <a:t> erstellt werden </a:t>
+            </a:r>
+            <a:r>
+              <a:rPr lang="de-DE" dirty="0" smtClean="0"/>
+              <a:t>kann</a:t>
+            </a:r>
+          </a:p>
+          <a:p>
+            <a:r>
+              <a:rPr lang="de-DE" dirty="0" smtClean="0"/>
+              <a:t>Demo von Testdurchlauf mit Test Editor und </a:t>
+            </a:r>
+            <a:r>
+              <a:rPr lang="de-DE" dirty="0" err="1" smtClean="0"/>
+              <a:t>Inspector</a:t>
+            </a:r>
             <a:endParaRPr lang="de-DE" dirty="0" smtClean="0"/>
           </a:p>
         </p:txBody>
@@ -7576,7 +7669,7 @@
             </a:br>
             <a:r>
               <a:rPr lang="de-DE" sz="2000" dirty="0" smtClean="0"/>
-              <a:t>Hürden mit dem </a:t>
+              <a:t>zweiter Meilenstein - Negatives am </a:t>
             </a:r>
             <a:r>
               <a:rPr lang="de-DE" sz="2000" dirty="0" err="1" smtClean="0"/>
@@ -7602,10 +7695,161 @@
         </p:nvSpPr>
         <p:spPr/>
         <p:txBody>
-          <a:bodyPr/>
-          <a:lstStyle/>
-          <a:p>
-            <a:endParaRPr lang="de-DE" dirty="0"/>
+          <a:bodyPr>
+            <a:normAutofit/>
+          </a:bodyPr>
+          <a:lstStyle/>
+          <a:p>
+            <a:pPr>
+              <a:spcBef>
+                <a:spcPts val="0"/>
+              </a:spcBef>
+            </a:pPr>
+            <a:r>
+              <a:rPr lang="de-DE" sz="2200" dirty="0" smtClean="0"/>
+              <a:t>Dokumentation </a:t>
+            </a:r>
+            <a:r>
+              <a:rPr lang="de-DE" sz="2200" dirty="0"/>
+              <a:t>zur Erstellung des </a:t>
+            </a:r>
+            <a:r>
+              <a:rPr lang="de-DE" sz="2200" dirty="0" err="1"/>
+              <a:t>Fixtures</a:t>
+            </a:r>
+            <a:r>
+              <a:rPr lang="de-DE" sz="2200" dirty="0"/>
+              <a:t> </a:t>
+            </a:r>
+            <a:r>
+              <a:rPr lang="de-DE" sz="2200" dirty="0" smtClean="0"/>
+              <a:t>veraltet / nicht ausführlich</a:t>
+            </a:r>
+            <a:endParaRPr lang="de-DE" sz="2200" dirty="0"/>
+          </a:p>
+          <a:p>
+            <a:pPr>
+              <a:spcBef>
+                <a:spcPts val="0"/>
+              </a:spcBef>
+            </a:pPr>
+            <a:r>
+              <a:rPr lang="de-DE" sz="2200" dirty="0"/>
+              <a:t>Debuggen durch </a:t>
+            </a:r>
+            <a:r>
+              <a:rPr lang="de-DE" sz="2200" dirty="0" smtClean="0"/>
+              <a:t>unpräzise </a:t>
+            </a:r>
+            <a:r>
+              <a:rPr lang="de-DE" sz="2200" dirty="0"/>
+              <a:t>Fehlermeldungen </a:t>
+            </a:r>
+            <a:r>
+              <a:rPr lang="de-DE" sz="2200" dirty="0" smtClean="0"/>
+              <a:t>schwierig</a:t>
+            </a:r>
+            <a:r>
+              <a:rPr lang="de-DE" sz="2200" dirty="0"/>
+              <a:t> </a:t>
+            </a:r>
+            <a:r>
+              <a:rPr lang="de-DE" sz="2200" dirty="0" smtClean="0"/>
+              <a:t>(Teils Problem von </a:t>
+            </a:r>
+            <a:r>
+              <a:rPr lang="de-DE" sz="2200" dirty="0" err="1" smtClean="0"/>
+              <a:t>Fitnesse</a:t>
+            </a:r>
+            <a:r>
+              <a:rPr lang="de-DE" sz="2200" dirty="0" smtClean="0"/>
+              <a:t>)</a:t>
+            </a:r>
+          </a:p>
+          <a:p>
+            <a:pPr>
+              <a:spcBef>
+                <a:spcPts val="0"/>
+              </a:spcBef>
+            </a:pPr>
+            <a:r>
+              <a:rPr lang="de-DE" sz="2200" dirty="0" smtClean="0"/>
+              <a:t>Neues Projekt kann kein „Template“ nutzen (z.B. </a:t>
+            </a:r>
+            <a:r>
+              <a:rPr lang="de-DE" sz="2200" dirty="0" err="1" smtClean="0"/>
+              <a:t>WebTest</a:t>
+            </a:r>
+            <a:r>
+              <a:rPr lang="de-DE" sz="2200" dirty="0" smtClean="0"/>
+              <a:t>, </a:t>
+            </a:r>
+            <a:r>
+              <a:rPr lang="de-DE" sz="2200" dirty="0" err="1" smtClean="0"/>
+              <a:t>AppiumTests</a:t>
+            </a:r>
+            <a:r>
+              <a:rPr lang="de-DE" sz="2200" dirty="0" smtClean="0"/>
+              <a:t>)</a:t>
+            </a:r>
+          </a:p>
+          <a:p>
+            <a:pPr>
+              <a:spcBef>
+                <a:spcPts val="0"/>
+              </a:spcBef>
+            </a:pPr>
+            <a:r>
+              <a:rPr lang="de-DE" sz="2200" dirty="0" smtClean="0"/>
+              <a:t>Kein </a:t>
+            </a:r>
+            <a:r>
+              <a:rPr lang="de-DE" sz="2200" dirty="0" err="1" smtClean="0"/>
+              <a:t>Copy</a:t>
+            </a:r>
+            <a:r>
+              <a:rPr lang="de-DE" sz="2200" dirty="0" smtClean="0"/>
+              <a:t> &amp; Paste von Testschritten aus normalem Text möglich</a:t>
+            </a:r>
+          </a:p>
+          <a:p>
+            <a:pPr>
+              <a:spcBef>
+                <a:spcPts val="0"/>
+              </a:spcBef>
+            </a:pPr>
+            <a:r>
+              <a:rPr lang="de-DE" sz="2200" dirty="0" smtClean="0"/>
+              <a:t>Oftmals viel Quelltextarbeit</a:t>
+            </a:r>
+          </a:p>
+          <a:p>
+            <a:pPr lvl="1">
+              <a:spcBef>
+                <a:spcPts val="0"/>
+              </a:spcBef>
+            </a:pPr>
+            <a:r>
+              <a:rPr lang="de-DE" sz="2000" dirty="0" smtClean="0"/>
+              <a:t>z.B. normaler Nutzer kann kein Szenario mit Variablen bauen</a:t>
+            </a:r>
+            <a:endParaRPr lang="de-DE" sz="2200" dirty="0" smtClean="0"/>
+          </a:p>
+          <a:p>
+            <a:pPr>
+              <a:spcBef>
+                <a:spcPts val="0"/>
+              </a:spcBef>
+            </a:pPr>
+            <a:endParaRPr lang="de-DE" sz="2200" dirty="0" smtClean="0"/>
+          </a:p>
+          <a:p>
+            <a:pPr>
+              <a:spcBef>
+                <a:spcPts val="0"/>
+              </a:spcBef>
+            </a:pPr>
+            <a:endParaRPr lang="de-DE" sz="2200" dirty="0" smtClean="0"/>
           </a:p>
         </p:txBody>
       </p:sp>

</xml_diff>